<commit_message>
major update, now using vp
</commit_message>
<xml_diff>
--- a/figures/C1.pptx
+++ b/figures/C1.pptx
@@ -1,11 +1,11 @@
 
 <file path=ppt/presentation.xml><?xml version="1.0" encoding="utf-8"?>
-<p:presentation xmlns:p="http://schemas.openxmlformats.org/presentationml/2006/main" xmlns:r="http://schemas.openxmlformats.org/officeDocument/2006/relationships" xmlns:a="http://schemas.openxmlformats.org/drawingml/2006/main" xmlns:mc="http://schemas.openxmlformats.org/markup-compatibility/2006" xmlns:c="http://schemas.openxmlformats.org/drawingml/2006/chart" xmlns:ns6="http://schemas.openxmlformats.org/drawingml/2006/chartDrawing" xmlns:dgm="http://schemas.openxmlformats.org/drawingml/2006/diagram" xmlns:pic="http://schemas.openxmlformats.org/drawingml/2006/picture" xmlns:wp="http://schemas.openxmlformats.org/drawingml/2006/wordprocessingDrawing" xmlns:xdr="http://schemas.openxmlformats.org/drawingml/2006/spreadsheetDrawing" xmlns:ns11="http://schemas.openxmlformats.org/drawingml/2006/compatibility" xmlns:ns12="http://schemas.openxmlformats.org/drawingml/2006/lockedCanvas" saveSubsetFonts="true">
+<p:presentation xmlns:a="http://schemas.openxmlformats.org/drawingml/2006/main" xmlns:r="http://schemas.openxmlformats.org/officeDocument/2006/relationships" xmlns:p="http://schemas.openxmlformats.org/presentationml/2006/main" xmlns:mc="http://schemas.openxmlformats.org/markup-compatibility/2006" xmlns:c="http://schemas.openxmlformats.org/drawingml/2006/chart" xmlns:ns6="http://schemas.openxmlformats.org/drawingml/2006/chartDrawing" xmlns:dgm="http://schemas.openxmlformats.org/drawingml/2006/diagram" xmlns:pic="http://schemas.openxmlformats.org/drawingml/2006/picture" xmlns:wp="http://schemas.openxmlformats.org/drawingml/2006/wordprocessingDrawing" xmlns:xdr="http://schemas.openxmlformats.org/drawingml/2006/spreadsheetDrawing" xmlns:ns11="http://schemas.openxmlformats.org/drawingml/2006/compatibility" xmlns:ns12="http://schemas.openxmlformats.org/drawingml/2006/lockedCanvas" saveSubsetFonts="true">
   <p:sldMasterIdLst>
     <p:sldMasterId id="2147483648" r:id="rId1"/>
   </p:sldMasterIdLst>
   <p:sldIdLst>
-    <p:sldId id="616480935" r:id="rId6"/>
+    <p:sldId id="91872333" r:id="rId6"/>
   </p:sldIdLst>
   <p:sldSz cx="12192000" cy="6858000"/>
   <p:notesSz cx="6858000" cy="9144000"/>
@@ -113,7 +113,7 @@
 </file>
 
 <file path=ppt/slideLayouts/slideLayout1.xml><?xml version="1.0" encoding="utf-8"?>
-<p:sldLayout xmlns:p="http://schemas.openxmlformats.org/presentationml/2006/main" xmlns:r="http://schemas.openxmlformats.org/officeDocument/2006/relationships" xmlns:a="http://schemas.openxmlformats.org/drawingml/2006/main" xmlns:mc="http://schemas.openxmlformats.org/markup-compatibility/2006" xmlns:c="http://schemas.openxmlformats.org/drawingml/2006/chart" xmlns:ns6="http://schemas.openxmlformats.org/drawingml/2006/chartDrawing" xmlns:dgm="http://schemas.openxmlformats.org/drawingml/2006/diagram" xmlns:pic="http://schemas.openxmlformats.org/drawingml/2006/picture" xmlns:wp="http://schemas.openxmlformats.org/drawingml/2006/wordprocessingDrawing" xmlns:xdr="http://schemas.openxmlformats.org/drawingml/2006/spreadsheetDrawing" xmlns:ns11="http://schemas.openxmlformats.org/drawingml/2006/compatibility" xmlns:ns12="http://schemas.openxmlformats.org/drawingml/2006/lockedCanvas" type="title" preserve="true">
+<p:sldLayout xmlns:a="http://schemas.openxmlformats.org/drawingml/2006/main" xmlns:r="http://schemas.openxmlformats.org/officeDocument/2006/relationships" xmlns:p="http://schemas.openxmlformats.org/presentationml/2006/main" xmlns:mc="http://schemas.openxmlformats.org/markup-compatibility/2006" xmlns:c="http://schemas.openxmlformats.org/drawingml/2006/chart" xmlns:ns6="http://schemas.openxmlformats.org/drawingml/2006/chartDrawing" xmlns:dgm="http://schemas.openxmlformats.org/drawingml/2006/diagram" xmlns:pic="http://schemas.openxmlformats.org/drawingml/2006/picture" xmlns:wp="http://schemas.openxmlformats.org/drawingml/2006/wordprocessingDrawing" xmlns:xdr="http://schemas.openxmlformats.org/drawingml/2006/spreadsheetDrawing" xmlns:ns11="http://schemas.openxmlformats.org/drawingml/2006/compatibility" xmlns:ns12="http://schemas.openxmlformats.org/drawingml/2006/lockedCanvas" type="title" preserve="true">
   <p:cSld name="Title Slide">
     <p:spTree>
       <p:nvGrpSpPr>
@@ -312,7 +312,7 @@
 </file>
 
 <file path=ppt/slideLayouts/slideLayout10.xml><?xml version="1.0" encoding="utf-8"?>
-<p:sldLayout xmlns:p="http://schemas.openxmlformats.org/presentationml/2006/main" xmlns:r="http://schemas.openxmlformats.org/officeDocument/2006/relationships" xmlns:a="http://schemas.openxmlformats.org/drawingml/2006/main" xmlns:mc="http://schemas.openxmlformats.org/markup-compatibility/2006" xmlns:c="http://schemas.openxmlformats.org/drawingml/2006/chart" xmlns:ns6="http://schemas.openxmlformats.org/drawingml/2006/chartDrawing" xmlns:dgm="http://schemas.openxmlformats.org/drawingml/2006/diagram" xmlns:pic="http://schemas.openxmlformats.org/drawingml/2006/picture" xmlns:wp="http://schemas.openxmlformats.org/drawingml/2006/wordprocessingDrawing" xmlns:xdr="http://schemas.openxmlformats.org/drawingml/2006/spreadsheetDrawing" xmlns:ns11="http://schemas.openxmlformats.org/drawingml/2006/compatibility" xmlns:ns12="http://schemas.openxmlformats.org/drawingml/2006/lockedCanvas" type="vertTitleAndTx" preserve="true">
+<p:sldLayout xmlns:a="http://schemas.openxmlformats.org/drawingml/2006/main" xmlns:r="http://schemas.openxmlformats.org/officeDocument/2006/relationships" xmlns:p="http://schemas.openxmlformats.org/presentationml/2006/main" xmlns:mc="http://schemas.openxmlformats.org/markup-compatibility/2006" xmlns:c="http://schemas.openxmlformats.org/drawingml/2006/chart" xmlns:ns6="http://schemas.openxmlformats.org/drawingml/2006/chartDrawing" xmlns:dgm="http://schemas.openxmlformats.org/drawingml/2006/diagram" xmlns:pic="http://schemas.openxmlformats.org/drawingml/2006/picture" xmlns:wp="http://schemas.openxmlformats.org/drawingml/2006/wordprocessingDrawing" xmlns:xdr="http://schemas.openxmlformats.org/drawingml/2006/spreadsheetDrawing" xmlns:ns11="http://schemas.openxmlformats.org/drawingml/2006/compatibility" xmlns:ns12="http://schemas.openxmlformats.org/drawingml/2006/lockedCanvas" type="vertTitleAndTx" preserve="true">
   <p:cSld name="Vertical Title and Text">
     <p:spTree>
       <p:nvGrpSpPr>
@@ -499,7 +499,7 @@
 </file>
 
 <file path=ppt/slideLayouts/slideLayout2.xml><?xml version="1.0" encoding="utf-8"?>
-<p:sldLayout xmlns:p="http://schemas.openxmlformats.org/presentationml/2006/main" xmlns:r="http://schemas.openxmlformats.org/officeDocument/2006/relationships" xmlns:a="http://schemas.openxmlformats.org/drawingml/2006/main" xmlns:mc="http://schemas.openxmlformats.org/markup-compatibility/2006" xmlns:c="http://schemas.openxmlformats.org/drawingml/2006/chart" xmlns:ns6="http://schemas.openxmlformats.org/drawingml/2006/chartDrawing" xmlns:dgm="http://schemas.openxmlformats.org/drawingml/2006/diagram" xmlns:pic="http://schemas.openxmlformats.org/drawingml/2006/picture" xmlns:wp="http://schemas.openxmlformats.org/drawingml/2006/wordprocessingDrawing" xmlns:xdr="http://schemas.openxmlformats.org/drawingml/2006/spreadsheetDrawing" xmlns:ns11="http://schemas.openxmlformats.org/drawingml/2006/compatibility" xmlns:ns12="http://schemas.openxmlformats.org/drawingml/2006/lockedCanvas" type="obj" preserve="true">
+<p:sldLayout xmlns:a="http://schemas.openxmlformats.org/drawingml/2006/main" xmlns:r="http://schemas.openxmlformats.org/officeDocument/2006/relationships" xmlns:p="http://schemas.openxmlformats.org/presentationml/2006/main" xmlns:mc="http://schemas.openxmlformats.org/markup-compatibility/2006" xmlns:c="http://schemas.openxmlformats.org/drawingml/2006/chart" xmlns:ns6="http://schemas.openxmlformats.org/drawingml/2006/chartDrawing" xmlns:dgm="http://schemas.openxmlformats.org/drawingml/2006/diagram" xmlns:pic="http://schemas.openxmlformats.org/drawingml/2006/picture" xmlns:wp="http://schemas.openxmlformats.org/drawingml/2006/wordprocessingDrawing" xmlns:xdr="http://schemas.openxmlformats.org/drawingml/2006/spreadsheetDrawing" xmlns:ns11="http://schemas.openxmlformats.org/drawingml/2006/compatibility" xmlns:ns12="http://schemas.openxmlformats.org/drawingml/2006/lockedCanvas" type="obj" preserve="true">
   <p:cSld name="Title and Content">
     <p:spTree>
       <p:nvGrpSpPr>
@@ -681,7 +681,7 @@
 </file>
 
 <file path=ppt/slideLayouts/slideLayout3.xml><?xml version="1.0" encoding="utf-8"?>
-<p:sldLayout xmlns:p="http://schemas.openxmlformats.org/presentationml/2006/main" xmlns:r="http://schemas.openxmlformats.org/officeDocument/2006/relationships" xmlns:a="http://schemas.openxmlformats.org/drawingml/2006/main" xmlns:mc="http://schemas.openxmlformats.org/markup-compatibility/2006" xmlns:c="http://schemas.openxmlformats.org/drawingml/2006/chart" xmlns:ns6="http://schemas.openxmlformats.org/drawingml/2006/chartDrawing" xmlns:dgm="http://schemas.openxmlformats.org/drawingml/2006/diagram" xmlns:pic="http://schemas.openxmlformats.org/drawingml/2006/picture" xmlns:wp="http://schemas.openxmlformats.org/drawingml/2006/wordprocessingDrawing" xmlns:xdr="http://schemas.openxmlformats.org/drawingml/2006/spreadsheetDrawing" xmlns:ns11="http://schemas.openxmlformats.org/drawingml/2006/compatibility" xmlns:ns12="http://schemas.openxmlformats.org/drawingml/2006/lockedCanvas" type="secHead" preserve="true">
+<p:sldLayout xmlns:a="http://schemas.openxmlformats.org/drawingml/2006/main" xmlns:r="http://schemas.openxmlformats.org/officeDocument/2006/relationships" xmlns:p="http://schemas.openxmlformats.org/presentationml/2006/main" xmlns:mc="http://schemas.openxmlformats.org/markup-compatibility/2006" xmlns:c="http://schemas.openxmlformats.org/drawingml/2006/chart" xmlns:ns6="http://schemas.openxmlformats.org/drawingml/2006/chartDrawing" xmlns:dgm="http://schemas.openxmlformats.org/drawingml/2006/diagram" xmlns:pic="http://schemas.openxmlformats.org/drawingml/2006/picture" xmlns:wp="http://schemas.openxmlformats.org/drawingml/2006/wordprocessingDrawing" xmlns:xdr="http://schemas.openxmlformats.org/drawingml/2006/spreadsheetDrawing" xmlns:ns11="http://schemas.openxmlformats.org/drawingml/2006/compatibility" xmlns:ns12="http://schemas.openxmlformats.org/drawingml/2006/lockedCanvas" type="secHead" preserve="true">
   <p:cSld name="Section Header">
     <p:spTree>
       <p:nvGrpSpPr>
@@ -934,7 +934,7 @@
 </file>
 
 <file path=ppt/slideLayouts/slideLayout4.xml><?xml version="1.0" encoding="utf-8"?>
-<p:sldLayout xmlns:p="http://schemas.openxmlformats.org/presentationml/2006/main" xmlns:r="http://schemas.openxmlformats.org/officeDocument/2006/relationships" xmlns:a="http://schemas.openxmlformats.org/drawingml/2006/main" xmlns:mc="http://schemas.openxmlformats.org/markup-compatibility/2006" xmlns:c="http://schemas.openxmlformats.org/drawingml/2006/chart" xmlns:ns6="http://schemas.openxmlformats.org/drawingml/2006/chartDrawing" xmlns:dgm="http://schemas.openxmlformats.org/drawingml/2006/diagram" xmlns:pic="http://schemas.openxmlformats.org/drawingml/2006/picture" xmlns:wp="http://schemas.openxmlformats.org/drawingml/2006/wordprocessingDrawing" xmlns:xdr="http://schemas.openxmlformats.org/drawingml/2006/spreadsheetDrawing" xmlns:ns11="http://schemas.openxmlformats.org/drawingml/2006/compatibility" xmlns:ns12="http://schemas.openxmlformats.org/drawingml/2006/lockedCanvas" type="twoObj" preserve="true">
+<p:sldLayout xmlns:a="http://schemas.openxmlformats.org/drawingml/2006/main" xmlns:r="http://schemas.openxmlformats.org/officeDocument/2006/relationships" xmlns:p="http://schemas.openxmlformats.org/presentationml/2006/main" xmlns:mc="http://schemas.openxmlformats.org/markup-compatibility/2006" xmlns:c="http://schemas.openxmlformats.org/drawingml/2006/chart" xmlns:ns6="http://schemas.openxmlformats.org/drawingml/2006/chartDrawing" xmlns:dgm="http://schemas.openxmlformats.org/drawingml/2006/diagram" xmlns:pic="http://schemas.openxmlformats.org/drawingml/2006/picture" xmlns:wp="http://schemas.openxmlformats.org/drawingml/2006/wordprocessingDrawing" xmlns:xdr="http://schemas.openxmlformats.org/drawingml/2006/spreadsheetDrawing" xmlns:ns11="http://schemas.openxmlformats.org/drawingml/2006/compatibility" xmlns:ns12="http://schemas.openxmlformats.org/drawingml/2006/lockedCanvas" type="twoObj" preserve="true">
   <p:cSld name="Two Content">
     <p:spTree>
       <p:nvGrpSpPr>
@@ -1173,7 +1173,7 @@
 </file>
 
 <file path=ppt/slideLayouts/slideLayout5.xml><?xml version="1.0" encoding="utf-8"?>
-<p:sldLayout xmlns:p="http://schemas.openxmlformats.org/presentationml/2006/main" xmlns:r="http://schemas.openxmlformats.org/officeDocument/2006/relationships" xmlns:a="http://schemas.openxmlformats.org/drawingml/2006/main" xmlns:mc="http://schemas.openxmlformats.org/markup-compatibility/2006" xmlns:c="http://schemas.openxmlformats.org/drawingml/2006/chart" xmlns:ns6="http://schemas.openxmlformats.org/drawingml/2006/chartDrawing" xmlns:dgm="http://schemas.openxmlformats.org/drawingml/2006/diagram" xmlns:pic="http://schemas.openxmlformats.org/drawingml/2006/picture" xmlns:wp="http://schemas.openxmlformats.org/drawingml/2006/wordprocessingDrawing" xmlns:xdr="http://schemas.openxmlformats.org/drawingml/2006/spreadsheetDrawing" xmlns:ns11="http://schemas.openxmlformats.org/drawingml/2006/compatibility" xmlns:ns12="http://schemas.openxmlformats.org/drawingml/2006/lockedCanvas" type="twoTxTwoObj" preserve="true">
+<p:sldLayout xmlns:a="http://schemas.openxmlformats.org/drawingml/2006/main" xmlns:r="http://schemas.openxmlformats.org/officeDocument/2006/relationships" xmlns:p="http://schemas.openxmlformats.org/presentationml/2006/main" xmlns:mc="http://schemas.openxmlformats.org/markup-compatibility/2006" xmlns:c="http://schemas.openxmlformats.org/drawingml/2006/chart" xmlns:ns6="http://schemas.openxmlformats.org/drawingml/2006/chartDrawing" xmlns:dgm="http://schemas.openxmlformats.org/drawingml/2006/diagram" xmlns:pic="http://schemas.openxmlformats.org/drawingml/2006/picture" xmlns:wp="http://schemas.openxmlformats.org/drawingml/2006/wordprocessingDrawing" xmlns:xdr="http://schemas.openxmlformats.org/drawingml/2006/spreadsheetDrawing" xmlns:ns11="http://schemas.openxmlformats.org/drawingml/2006/compatibility" xmlns:ns12="http://schemas.openxmlformats.org/drawingml/2006/lockedCanvas" type="twoTxTwoObj" preserve="true">
   <p:cSld name="Comparison">
     <p:spTree>
       <p:nvGrpSpPr>
@@ -1528,7 +1528,7 @@
 </file>
 
 <file path=ppt/slideLayouts/slideLayout6.xml><?xml version="1.0" encoding="utf-8"?>
-<p:sldLayout xmlns:p="http://schemas.openxmlformats.org/presentationml/2006/main" xmlns:r="http://schemas.openxmlformats.org/officeDocument/2006/relationships" xmlns:a="http://schemas.openxmlformats.org/drawingml/2006/main" xmlns:mc="http://schemas.openxmlformats.org/markup-compatibility/2006" xmlns:c="http://schemas.openxmlformats.org/drawingml/2006/chart" xmlns:ns6="http://schemas.openxmlformats.org/drawingml/2006/chartDrawing" xmlns:dgm="http://schemas.openxmlformats.org/drawingml/2006/diagram" xmlns:pic="http://schemas.openxmlformats.org/drawingml/2006/picture" xmlns:wp="http://schemas.openxmlformats.org/drawingml/2006/wordprocessingDrawing" xmlns:xdr="http://schemas.openxmlformats.org/drawingml/2006/spreadsheetDrawing" xmlns:ns11="http://schemas.openxmlformats.org/drawingml/2006/compatibility" xmlns:ns12="http://schemas.openxmlformats.org/drawingml/2006/lockedCanvas" type="titleOnly" preserve="true">
+<p:sldLayout xmlns:a="http://schemas.openxmlformats.org/drawingml/2006/main" xmlns:r="http://schemas.openxmlformats.org/officeDocument/2006/relationships" xmlns:p="http://schemas.openxmlformats.org/presentationml/2006/main" xmlns:mc="http://schemas.openxmlformats.org/markup-compatibility/2006" xmlns:c="http://schemas.openxmlformats.org/drawingml/2006/chart" xmlns:ns6="http://schemas.openxmlformats.org/drawingml/2006/chartDrawing" xmlns:dgm="http://schemas.openxmlformats.org/drawingml/2006/diagram" xmlns:pic="http://schemas.openxmlformats.org/drawingml/2006/picture" xmlns:wp="http://schemas.openxmlformats.org/drawingml/2006/wordprocessingDrawing" xmlns:xdr="http://schemas.openxmlformats.org/drawingml/2006/spreadsheetDrawing" xmlns:ns11="http://schemas.openxmlformats.org/drawingml/2006/compatibility" xmlns:ns12="http://schemas.openxmlformats.org/drawingml/2006/lockedCanvas" type="titleOnly" preserve="true">
   <p:cSld name="Title Only">
     <p:spTree>
       <p:nvGrpSpPr>
@@ -1653,7 +1653,7 @@
 </file>
 
 <file path=ppt/slideLayouts/slideLayout7.xml><?xml version="1.0" encoding="utf-8"?>
-<p:sldLayout xmlns:p="http://schemas.openxmlformats.org/presentationml/2006/main" xmlns:r="http://schemas.openxmlformats.org/officeDocument/2006/relationships" xmlns:a="http://schemas.openxmlformats.org/drawingml/2006/main" xmlns:mc="http://schemas.openxmlformats.org/markup-compatibility/2006" xmlns:c="http://schemas.openxmlformats.org/drawingml/2006/chart" xmlns:ns6="http://schemas.openxmlformats.org/drawingml/2006/chartDrawing" xmlns:dgm="http://schemas.openxmlformats.org/drawingml/2006/diagram" xmlns:pic="http://schemas.openxmlformats.org/drawingml/2006/picture" xmlns:wp="http://schemas.openxmlformats.org/drawingml/2006/wordprocessingDrawing" xmlns:xdr="http://schemas.openxmlformats.org/drawingml/2006/spreadsheetDrawing" xmlns:ns11="http://schemas.openxmlformats.org/drawingml/2006/compatibility" xmlns:ns12="http://schemas.openxmlformats.org/drawingml/2006/lockedCanvas" type="blank" preserve="true">
+<p:sldLayout xmlns:a="http://schemas.openxmlformats.org/drawingml/2006/main" xmlns:r="http://schemas.openxmlformats.org/officeDocument/2006/relationships" xmlns:p="http://schemas.openxmlformats.org/presentationml/2006/main" xmlns:mc="http://schemas.openxmlformats.org/markup-compatibility/2006" xmlns:c="http://schemas.openxmlformats.org/drawingml/2006/chart" xmlns:ns6="http://schemas.openxmlformats.org/drawingml/2006/chartDrawing" xmlns:dgm="http://schemas.openxmlformats.org/drawingml/2006/diagram" xmlns:pic="http://schemas.openxmlformats.org/drawingml/2006/picture" xmlns:wp="http://schemas.openxmlformats.org/drawingml/2006/wordprocessingDrawing" xmlns:xdr="http://schemas.openxmlformats.org/drawingml/2006/spreadsheetDrawing" xmlns:ns11="http://schemas.openxmlformats.org/drawingml/2006/compatibility" xmlns:ns12="http://schemas.openxmlformats.org/drawingml/2006/lockedCanvas" type="blank" preserve="true">
   <p:cSld name="Blank">
     <p:spTree>
       <p:nvGrpSpPr>
@@ -1755,7 +1755,7 @@
 </file>
 
 <file path=ppt/slideLayouts/slideLayout8.xml><?xml version="1.0" encoding="utf-8"?>
-<p:sldLayout xmlns:p="http://schemas.openxmlformats.org/presentationml/2006/main" xmlns:r="http://schemas.openxmlformats.org/officeDocument/2006/relationships" xmlns:a="http://schemas.openxmlformats.org/drawingml/2006/main" xmlns:mc="http://schemas.openxmlformats.org/markup-compatibility/2006" xmlns:c="http://schemas.openxmlformats.org/drawingml/2006/chart" xmlns:ns6="http://schemas.openxmlformats.org/drawingml/2006/chartDrawing" xmlns:dgm="http://schemas.openxmlformats.org/drawingml/2006/diagram" xmlns:pic="http://schemas.openxmlformats.org/drawingml/2006/picture" xmlns:wp="http://schemas.openxmlformats.org/drawingml/2006/wordprocessingDrawing" xmlns:xdr="http://schemas.openxmlformats.org/drawingml/2006/spreadsheetDrawing" xmlns:ns11="http://schemas.openxmlformats.org/drawingml/2006/compatibility" xmlns:ns12="http://schemas.openxmlformats.org/drawingml/2006/lockedCanvas" type="objTx" preserve="true">
+<p:sldLayout xmlns:a="http://schemas.openxmlformats.org/drawingml/2006/main" xmlns:r="http://schemas.openxmlformats.org/officeDocument/2006/relationships" xmlns:p="http://schemas.openxmlformats.org/presentationml/2006/main" xmlns:mc="http://schemas.openxmlformats.org/markup-compatibility/2006" xmlns:c="http://schemas.openxmlformats.org/drawingml/2006/chart" xmlns:ns6="http://schemas.openxmlformats.org/drawingml/2006/chartDrawing" xmlns:dgm="http://schemas.openxmlformats.org/drawingml/2006/diagram" xmlns:pic="http://schemas.openxmlformats.org/drawingml/2006/picture" xmlns:wp="http://schemas.openxmlformats.org/drawingml/2006/wordprocessingDrawing" xmlns:xdr="http://schemas.openxmlformats.org/drawingml/2006/spreadsheetDrawing" xmlns:ns11="http://schemas.openxmlformats.org/drawingml/2006/compatibility" xmlns:ns12="http://schemas.openxmlformats.org/drawingml/2006/lockedCanvas" type="objTx" preserve="true">
   <p:cSld name="Content with Caption">
     <p:spTree>
       <p:nvGrpSpPr>
@@ -2039,7 +2039,7 @@
 </file>
 
 <file path=ppt/slideLayouts/slideLayout9.xml><?xml version="1.0" encoding="utf-8"?>
-<p:sldLayout xmlns:p="http://schemas.openxmlformats.org/presentationml/2006/main" xmlns:r="http://schemas.openxmlformats.org/officeDocument/2006/relationships" xmlns:a="http://schemas.openxmlformats.org/drawingml/2006/main" xmlns:mc="http://schemas.openxmlformats.org/markup-compatibility/2006" xmlns:c="http://schemas.openxmlformats.org/drawingml/2006/chart" xmlns:ns6="http://schemas.openxmlformats.org/drawingml/2006/chartDrawing" xmlns:dgm="http://schemas.openxmlformats.org/drawingml/2006/diagram" xmlns:pic="http://schemas.openxmlformats.org/drawingml/2006/picture" xmlns:wp="http://schemas.openxmlformats.org/drawingml/2006/wordprocessingDrawing" xmlns:xdr="http://schemas.openxmlformats.org/drawingml/2006/spreadsheetDrawing" xmlns:ns11="http://schemas.openxmlformats.org/drawingml/2006/compatibility" xmlns:ns12="http://schemas.openxmlformats.org/drawingml/2006/lockedCanvas" type="vertTx" preserve="true">
+<p:sldLayout xmlns:a="http://schemas.openxmlformats.org/drawingml/2006/main" xmlns:r="http://schemas.openxmlformats.org/officeDocument/2006/relationships" xmlns:p="http://schemas.openxmlformats.org/presentationml/2006/main" xmlns:mc="http://schemas.openxmlformats.org/markup-compatibility/2006" xmlns:c="http://schemas.openxmlformats.org/drawingml/2006/chart" xmlns:ns6="http://schemas.openxmlformats.org/drawingml/2006/chartDrawing" xmlns:dgm="http://schemas.openxmlformats.org/drawingml/2006/diagram" xmlns:pic="http://schemas.openxmlformats.org/drawingml/2006/picture" xmlns:wp="http://schemas.openxmlformats.org/drawingml/2006/wordprocessingDrawing" xmlns:xdr="http://schemas.openxmlformats.org/drawingml/2006/spreadsheetDrawing" xmlns:ns11="http://schemas.openxmlformats.org/drawingml/2006/compatibility" xmlns:ns12="http://schemas.openxmlformats.org/drawingml/2006/lockedCanvas" type="vertTx" preserve="true">
   <p:cSld name="Title and Vertical Text">
     <p:spTree>
       <p:nvGrpSpPr>
@@ -2216,7 +2216,7 @@
 </file>
 
 <file path=ppt/slideMasters/slideMaster1.xml><?xml version="1.0" encoding="utf-8"?>
-<p:sldMaster xmlns:p="http://schemas.openxmlformats.org/presentationml/2006/main" xmlns:r="http://schemas.openxmlformats.org/officeDocument/2006/relationships" xmlns:a="http://schemas.openxmlformats.org/drawingml/2006/main" xmlns:mc="http://schemas.openxmlformats.org/markup-compatibility/2006" xmlns:c="http://schemas.openxmlformats.org/drawingml/2006/chart" xmlns:ns6="http://schemas.openxmlformats.org/drawingml/2006/chartDrawing" xmlns:dgm="http://schemas.openxmlformats.org/drawingml/2006/diagram" xmlns:pic="http://schemas.openxmlformats.org/drawingml/2006/picture" xmlns:wp="http://schemas.openxmlformats.org/drawingml/2006/wordprocessingDrawing" xmlns:xdr="http://schemas.openxmlformats.org/drawingml/2006/spreadsheetDrawing" xmlns:ns11="http://schemas.openxmlformats.org/drawingml/2006/compatibility" xmlns:ns12="http://schemas.openxmlformats.org/drawingml/2006/lockedCanvas">
+<p:sldMaster xmlns:a="http://schemas.openxmlformats.org/drawingml/2006/main" xmlns:r="http://schemas.openxmlformats.org/officeDocument/2006/relationships" xmlns:p="http://schemas.openxmlformats.org/presentationml/2006/main" xmlns:mc="http://schemas.openxmlformats.org/markup-compatibility/2006" xmlns:c="http://schemas.openxmlformats.org/drawingml/2006/chart" xmlns:ns6="http://schemas.openxmlformats.org/drawingml/2006/chartDrawing" xmlns:dgm="http://schemas.openxmlformats.org/drawingml/2006/diagram" xmlns:pic="http://schemas.openxmlformats.org/drawingml/2006/picture" xmlns:wp="http://schemas.openxmlformats.org/drawingml/2006/wordprocessingDrawing" xmlns:xdr="http://schemas.openxmlformats.org/drawingml/2006/spreadsheetDrawing" xmlns:ns11="http://schemas.openxmlformats.org/drawingml/2006/compatibility" xmlns:ns12="http://schemas.openxmlformats.org/drawingml/2006/lockedCanvas">
   <p:cSld>
     <p:bg>
       <p:bgRef idx="1001">
@@ -2762,7 +2762,7 @@
 </file>
 
 <file path=ppt/slides/slide1.xml><?xml version="1.0" encoding="utf-8"?>
-<p:sld xmlns:p="http://schemas.openxmlformats.org/presentationml/2006/main" xmlns:r="http://schemas.openxmlformats.org/officeDocument/2006/relationships" xmlns:a="http://schemas.openxmlformats.org/drawingml/2006/main" xmlns:mc="http://schemas.openxmlformats.org/markup-compatibility/2006" xmlns:c="http://schemas.openxmlformats.org/drawingml/2006/chart" xmlns:ns6="http://schemas.openxmlformats.org/drawingml/2006/chartDrawing" xmlns:dgm="http://schemas.openxmlformats.org/drawingml/2006/diagram" xmlns:pic="http://schemas.openxmlformats.org/drawingml/2006/picture" xmlns:wp="http://schemas.openxmlformats.org/drawingml/2006/wordprocessingDrawing" xmlns:xdr="http://schemas.openxmlformats.org/drawingml/2006/spreadsheetDrawing" xmlns:ns11="http://schemas.openxmlformats.org/drawingml/2006/compatibility" xmlns:ns12="http://schemas.openxmlformats.org/drawingml/2006/lockedCanvas">
+<p:sld xmlns:a="http://schemas.openxmlformats.org/drawingml/2006/main" xmlns:r="http://schemas.openxmlformats.org/officeDocument/2006/relationships" xmlns:p="http://schemas.openxmlformats.org/presentationml/2006/main" xmlns:mc="http://schemas.openxmlformats.org/markup-compatibility/2006" xmlns:c="http://schemas.openxmlformats.org/drawingml/2006/chart" xmlns:ns6="http://schemas.openxmlformats.org/drawingml/2006/chartDrawing" xmlns:dgm="http://schemas.openxmlformats.org/drawingml/2006/diagram" xmlns:pic="http://schemas.openxmlformats.org/drawingml/2006/picture" xmlns:wp="http://schemas.openxmlformats.org/drawingml/2006/wordprocessingDrawing" xmlns:xdr="http://schemas.openxmlformats.org/drawingml/2006/spreadsheetDrawing" xmlns:ns11="http://schemas.openxmlformats.org/drawingml/2006/compatibility" xmlns:ns12="http://schemas.openxmlformats.org/drawingml/2006/lockedCanvas">
   <p:cSld>
     <p:spTree>
       <p:nvGrpSpPr>

</xml_diff>